<commit_message>
Updated pruning slides. Will maybe make more edits later.
</commit_message>
<xml_diff>
--- a/Images/Presentation/Presentation1.pptx
+++ b/Images/Presentation/Presentation1.pptx
@@ -355,7 +355,7 @@
           <a:p>
             <a:fld id="{D02EB887-C900-4FB3-9D2F-381B31F1A1AF}" type="datetimeFigureOut">
               <a:rPr lang="en-US" smtClean="0"/>
-              <a:t>4/23/2017</a:t>
+              <a:t>4/23/17</a:t>
             </a:fld>
             <a:endParaRPr lang="en-US"/>
           </a:p>
@@ -525,7 +525,7 @@
           <a:p>
             <a:fld id="{D02EB887-C900-4FB3-9D2F-381B31F1A1AF}" type="datetimeFigureOut">
               <a:rPr lang="en-US" smtClean="0"/>
-              <a:t>4/23/2017</a:t>
+              <a:t>4/23/17</a:t>
             </a:fld>
             <a:endParaRPr lang="en-US"/>
           </a:p>
@@ -705,7 +705,7 @@
           <a:p>
             <a:fld id="{D02EB887-C900-4FB3-9D2F-381B31F1A1AF}" type="datetimeFigureOut">
               <a:rPr lang="en-US" smtClean="0"/>
-              <a:t>4/23/2017</a:t>
+              <a:t>4/23/17</a:t>
             </a:fld>
             <a:endParaRPr lang="en-US"/>
           </a:p>
@@ -875,7 +875,7 @@
           <a:p>
             <a:fld id="{D02EB887-C900-4FB3-9D2F-381B31F1A1AF}" type="datetimeFigureOut">
               <a:rPr lang="en-US" smtClean="0"/>
-              <a:t>4/23/2017</a:t>
+              <a:t>4/23/17</a:t>
             </a:fld>
             <a:endParaRPr lang="en-US"/>
           </a:p>
@@ -1121,7 +1121,7 @@
           <a:p>
             <a:fld id="{D02EB887-C900-4FB3-9D2F-381B31F1A1AF}" type="datetimeFigureOut">
               <a:rPr lang="en-US" smtClean="0"/>
-              <a:t>4/23/2017</a:t>
+              <a:t>4/23/17</a:t>
             </a:fld>
             <a:endParaRPr lang="en-US"/>
           </a:p>
@@ -1409,7 +1409,7 @@
           <a:p>
             <a:fld id="{D02EB887-C900-4FB3-9D2F-381B31F1A1AF}" type="datetimeFigureOut">
               <a:rPr lang="en-US" smtClean="0"/>
-              <a:t>4/23/2017</a:t>
+              <a:t>4/23/17</a:t>
             </a:fld>
             <a:endParaRPr lang="en-US"/>
           </a:p>
@@ -1831,7 +1831,7 @@
           <a:p>
             <a:fld id="{D02EB887-C900-4FB3-9D2F-381B31F1A1AF}" type="datetimeFigureOut">
               <a:rPr lang="en-US" smtClean="0"/>
-              <a:t>4/23/2017</a:t>
+              <a:t>4/23/17</a:t>
             </a:fld>
             <a:endParaRPr lang="en-US"/>
           </a:p>
@@ -1949,7 +1949,7 @@
           <a:p>
             <a:fld id="{D02EB887-C900-4FB3-9D2F-381B31F1A1AF}" type="datetimeFigureOut">
               <a:rPr lang="en-US" smtClean="0"/>
-              <a:t>4/23/2017</a:t>
+              <a:t>4/23/17</a:t>
             </a:fld>
             <a:endParaRPr lang="en-US"/>
           </a:p>
@@ -2044,7 +2044,7 @@
           <a:p>
             <a:fld id="{D02EB887-C900-4FB3-9D2F-381B31F1A1AF}" type="datetimeFigureOut">
               <a:rPr lang="en-US" smtClean="0"/>
-              <a:t>4/23/2017</a:t>
+              <a:t>4/23/17</a:t>
             </a:fld>
             <a:endParaRPr lang="en-US"/>
           </a:p>
@@ -2321,7 +2321,7 @@
           <a:p>
             <a:fld id="{D02EB887-C900-4FB3-9D2F-381B31F1A1AF}" type="datetimeFigureOut">
               <a:rPr lang="en-US" smtClean="0"/>
-              <a:t>4/23/2017</a:t>
+              <a:t>4/23/17</a:t>
             </a:fld>
             <a:endParaRPr lang="en-US"/>
           </a:p>
@@ -2574,7 +2574,7 @@
           <a:p>
             <a:fld id="{D02EB887-C900-4FB3-9D2F-381B31F1A1AF}" type="datetimeFigureOut">
               <a:rPr lang="en-US" smtClean="0"/>
-              <a:t>4/23/2017</a:t>
+              <a:t>4/23/17</a:t>
             </a:fld>
             <a:endParaRPr lang="en-US"/>
           </a:p>
@@ -2787,7 +2787,7 @@
           <a:p>
             <a:fld id="{D02EB887-C900-4FB3-9D2F-381B31F1A1AF}" type="datetimeFigureOut">
               <a:rPr lang="en-US" smtClean="0"/>
-              <a:t>4/23/2017</a:t>
+              <a:t>4/23/17</a:t>
             </a:fld>
             <a:endParaRPr lang="en-US"/>
           </a:p>
@@ -3350,7 +3350,7 @@
                       <m:sSubSupPr>
                         <m:ctrlPr>
                           <a:rPr lang="en-US" sz="3600" i="1" smtClean="0">
-                            <a:latin typeface="Cambria Math" panose="02040503050406030204" pitchFamily="18" charset="0"/>
+                            <a:latin typeface="Cambria Math" charset="0"/>
                           </a:rPr>
                         </m:ctrlPr>
                       </m:sSubSupPr>
@@ -3383,7 +3383,7 @@
                       <m:dPr>
                         <m:ctrlPr>
                           <a:rPr lang="en-US" sz="3600" i="1" smtClean="0">
-                            <a:latin typeface="Cambria Math" panose="02040503050406030204" pitchFamily="18" charset="0"/>
+                            <a:latin typeface="Cambria Math" charset="0"/>
                           </a:rPr>
                         </m:ctrlPr>
                       </m:dPr>
@@ -3406,7 +3406,7 @@
                       <m:dPr>
                         <m:ctrlPr>
                           <a:rPr lang="en-US" sz="3600" b="0" i="1" smtClean="0">
-                            <a:latin typeface="Cambria Math" panose="02040503050406030204" pitchFamily="18" charset="0"/>
+                            <a:latin typeface="Cambria Math" charset="0"/>
                           </a:rPr>
                         </m:ctrlPr>
                       </m:dPr>
@@ -3430,7 +3430,7 @@
                             <m:supHide m:val="on"/>
                             <m:ctrlPr>
                               <a:rPr lang="en-US" sz="3600" b="0" i="1" smtClean="0">
-                                <a:latin typeface="Cambria Math" panose="02040503050406030204" pitchFamily="18" charset="0"/>
+                                <a:latin typeface="Cambria Math" charset="0"/>
                                 <a:ea typeface="Cambria Math" panose="02040503050406030204" pitchFamily="18" charset="0"/>
                               </a:rPr>
                             </m:ctrlPr>
@@ -3746,7 +3746,7 @@
                         <m:sSubSupPr>
                           <m:ctrlPr>
                             <a:rPr lang="en-US" i="1">
-                              <a:latin typeface="Cambria Math" panose="02040503050406030204" pitchFamily="18" charset="0"/>
+                              <a:latin typeface="Cambria Math" charset="0"/>
                             </a:rPr>
                           </m:ctrlPr>
                         </m:sSubSupPr>
@@ -3791,7 +3791,7 @@
                         <m:dPr>
                           <m:ctrlPr>
                             <a:rPr lang="en-US" i="1">
-                              <a:latin typeface="Cambria Math" panose="02040503050406030204" pitchFamily="18" charset="0"/>
+                              <a:latin typeface="Cambria Math" charset="0"/>
                             </a:rPr>
                           </m:ctrlPr>
                         </m:dPr>
@@ -3814,7 +3814,7 @@
                         <m:sSubSupPr>
                           <m:ctrlPr>
                             <a:rPr lang="en-US" i="1">
-                              <a:latin typeface="Cambria Math" panose="02040503050406030204" pitchFamily="18" charset="0"/>
+                              <a:latin typeface="Cambria Math" charset="0"/>
                             </a:rPr>
                           </m:ctrlPr>
                         </m:sSubSupPr>
@@ -3849,7 +3849,7 @@
                           <m:endChr m:val="]"/>
                           <m:ctrlPr>
                             <a:rPr lang="en-US" i="1">
-                              <a:latin typeface="Cambria Math" panose="02040503050406030204" pitchFamily="18" charset="0"/>
+                              <a:latin typeface="Cambria Math" charset="0"/>
                             </a:rPr>
                           </m:ctrlPr>
                         </m:dPr>
@@ -3858,7 +3858,7 @@
                             <m:sSubSupPr>
                               <m:ctrlPr>
                                 <a:rPr lang="en-US" i="1">
-                                  <a:latin typeface="Cambria Math" panose="02040503050406030204" pitchFamily="18" charset="0"/>
+                                  <a:latin typeface="Cambria Math" charset="0"/>
                                 </a:rPr>
                               </m:ctrlPr>
                             </m:sSubSupPr>
@@ -3903,7 +3903,7 @@
                             <m:dPr>
                               <m:ctrlPr>
                                 <a:rPr lang="en-US" i="1">
-                                  <a:latin typeface="Cambria Math" panose="02040503050406030204" pitchFamily="18" charset="0"/>
+                                  <a:latin typeface="Cambria Math" charset="0"/>
                                 </a:rPr>
                               </m:ctrlPr>
                             </m:dPr>
@@ -4290,7 +4290,7 @@
                           <m:sSubSupPr>
                             <m:ctrlPr>
                               <a:rPr lang="en-US" i="1" smtClean="0">
-                                <a:latin typeface="Cambria Math" panose="02040503050406030204" pitchFamily="18" charset="0"/>
+                                <a:latin typeface="Cambria Math" charset="0"/>
                               </a:rPr>
                             </m:ctrlPr>
                           </m:sSubSupPr>
@@ -4323,7 +4323,7 @@
                           <m:dPr>
                             <m:ctrlPr>
                               <a:rPr lang="en-US" i="1" smtClean="0">
-                                <a:latin typeface="Cambria Math" panose="02040503050406030204" pitchFamily="18" charset="0"/>
+                                <a:latin typeface="Cambria Math" charset="0"/>
                               </a:rPr>
                             </m:ctrlPr>
                           </m:dPr>
@@ -5003,7 +5003,7 @@
                       <m:sSubSupPr>
                         <m:ctrlPr>
                           <a:rPr lang="en-US" sz="4000" i="1" smtClean="0">
-                            <a:latin typeface="Cambria Math" panose="02040503050406030204" pitchFamily="18" charset="0"/>
+                            <a:latin typeface="Cambria Math" charset="0"/>
                           </a:rPr>
                         </m:ctrlPr>
                       </m:sSubSupPr>
@@ -5036,7 +5036,7 @@
                       <m:dPr>
                         <m:ctrlPr>
                           <a:rPr lang="en-US" sz="4000" i="1" smtClean="0">
-                            <a:latin typeface="Cambria Math" panose="02040503050406030204" pitchFamily="18" charset="0"/>
+                            <a:latin typeface="Cambria Math" charset="0"/>
                           </a:rPr>
                         </m:ctrlPr>
                       </m:dPr>
@@ -5059,7 +5059,7 @@
                       <m:sSubSupPr>
                         <m:ctrlPr>
                           <a:rPr lang="en-US" sz="4000" b="0" i="1" smtClean="0">
-                            <a:latin typeface="Cambria Math" panose="02040503050406030204" pitchFamily="18" charset="0"/>
+                            <a:latin typeface="Cambria Math" charset="0"/>
                           </a:rPr>
                         </m:ctrlPr>
                       </m:sSubSupPr>
@@ -5084,7 +5084,7 @@
                           <m:dPr>
                             <m:ctrlPr>
                               <a:rPr lang="en-US" sz="4000" b="0" i="1" smtClean="0">
-                                <a:latin typeface="Cambria Math" panose="02040503050406030204" pitchFamily="18" charset="0"/>
+                                <a:latin typeface="Cambria Math" charset="0"/>
                               </a:rPr>
                             </m:ctrlPr>
                           </m:dPr>
@@ -5103,7 +5103,7 @@
                       <m:dPr>
                         <m:ctrlPr>
                           <a:rPr lang="en-US" sz="4000" b="0" i="1" smtClean="0">
-                            <a:latin typeface="Cambria Math" panose="02040503050406030204" pitchFamily="18" charset="0"/>
+                            <a:latin typeface="Cambria Math" charset="0"/>
                           </a:rPr>
                         </m:ctrlPr>
                       </m:dPr>
@@ -5239,7 +5239,7 @@
                           <m:sSubSupPr>
                             <m:ctrlPr>
                               <a:rPr lang="en-US" i="1" smtClean="0">
-                                <a:latin typeface="Cambria Math" panose="02040503050406030204" pitchFamily="18" charset="0"/>
+                                <a:latin typeface="Cambria Math" charset="0"/>
                               </a:rPr>
                             </m:ctrlPr>
                           </m:sSubSupPr>
@@ -5272,7 +5272,7 @@
                           <m:dPr>
                             <m:ctrlPr>
                               <a:rPr lang="en-US" i="1" smtClean="0">
-                                <a:latin typeface="Cambria Math" panose="02040503050406030204" pitchFamily="18" charset="0"/>
+                                <a:latin typeface="Cambria Math" charset="0"/>
                               </a:rPr>
                             </m:ctrlPr>
                           </m:dPr>
@@ -5493,7 +5493,7 @@
                           <m:sSubSupPr>
                             <m:ctrlPr>
                               <a:rPr lang="en-US" i="1" smtClean="0">
-                                <a:latin typeface="Cambria Math" panose="02040503050406030204" pitchFamily="18" charset="0"/>
+                                <a:latin typeface="Cambria Math" charset="0"/>
                               </a:rPr>
                             </m:ctrlPr>
                           </m:sSubSupPr>
@@ -5538,7 +5538,7 @@
                           <m:dPr>
                             <m:ctrlPr>
                               <a:rPr lang="en-US" i="1" smtClean="0">
-                                <a:latin typeface="Cambria Math" panose="02040503050406030204" pitchFamily="18" charset="0"/>
+                                <a:latin typeface="Cambria Math" charset="0"/>
                               </a:rPr>
                             </m:ctrlPr>
                           </m:dPr>
@@ -5678,7 +5678,7 @@
                           <m:sSubSupPr>
                             <m:ctrlPr>
                               <a:rPr lang="en-US" i="1" smtClean="0">
-                                <a:latin typeface="Cambria Math" panose="02040503050406030204" pitchFamily="18" charset="0"/>
+                                <a:latin typeface="Cambria Math" charset="0"/>
                               </a:rPr>
                             </m:ctrlPr>
                           </m:sSubSupPr>
@@ -5723,7 +5723,7 @@
                           <m:dPr>
                             <m:ctrlPr>
                               <a:rPr lang="en-US" i="1" smtClean="0">
-                                <a:latin typeface="Cambria Math" panose="02040503050406030204" pitchFamily="18" charset="0"/>
+                                <a:latin typeface="Cambria Math" charset="0"/>
                               </a:rPr>
                             </m:ctrlPr>
                           </m:dPr>
@@ -5863,7 +5863,7 @@
                           <m:sSubSupPr>
                             <m:ctrlPr>
                               <a:rPr lang="en-US" i="1" smtClean="0">
-                                <a:latin typeface="Cambria Math" panose="02040503050406030204" pitchFamily="18" charset="0"/>
+                                <a:latin typeface="Cambria Math" charset="0"/>
                               </a:rPr>
                             </m:ctrlPr>
                           </m:sSubSupPr>
@@ -5908,7 +5908,7 @@
                           <m:dPr>
                             <m:ctrlPr>
                               <a:rPr lang="en-US" i="1" smtClean="0">
-                                <a:latin typeface="Cambria Math" panose="02040503050406030204" pitchFamily="18" charset="0"/>
+                                <a:latin typeface="Cambria Math" charset="0"/>
                               </a:rPr>
                             </m:ctrlPr>
                           </m:dPr>
@@ -6048,7 +6048,7 @@
                           <m:sSubSupPr>
                             <m:ctrlPr>
                               <a:rPr lang="en-US" i="1" smtClean="0">
-                                <a:latin typeface="Cambria Math" panose="02040503050406030204" pitchFamily="18" charset="0"/>
+                                <a:latin typeface="Cambria Math" charset="0"/>
                               </a:rPr>
                             </m:ctrlPr>
                           </m:sSubSupPr>
@@ -6093,7 +6093,7 @@
                           <m:dPr>
                             <m:ctrlPr>
                               <a:rPr lang="en-US" i="1" smtClean="0">
-                                <a:latin typeface="Cambria Math" panose="02040503050406030204" pitchFamily="18" charset="0"/>
+                                <a:latin typeface="Cambria Math" charset="0"/>
                               </a:rPr>
                             </m:ctrlPr>
                           </m:dPr>
@@ -6233,7 +6233,7 @@
                           <m:sSubSupPr>
                             <m:ctrlPr>
                               <a:rPr lang="en-US" i="1" smtClean="0">
-                                <a:latin typeface="Cambria Math" panose="02040503050406030204" pitchFamily="18" charset="0"/>
+                                <a:latin typeface="Cambria Math" charset="0"/>
                               </a:rPr>
                             </m:ctrlPr>
                           </m:sSubSupPr>
@@ -6278,7 +6278,7 @@
                           <m:dPr>
                             <m:ctrlPr>
                               <a:rPr lang="en-US" i="1" smtClean="0">
-                                <a:latin typeface="Cambria Math" panose="02040503050406030204" pitchFamily="18" charset="0"/>
+                                <a:latin typeface="Cambria Math" charset="0"/>
                               </a:rPr>
                             </m:ctrlPr>
                           </m:dPr>
@@ -7113,7 +7113,7 @@
                       <m:sSubSupPr>
                         <m:ctrlPr>
                           <a:rPr lang="en-US" sz="3600" i="1" smtClean="0">
-                            <a:latin typeface="Cambria Math" panose="02040503050406030204" pitchFamily="18" charset="0"/>
+                            <a:latin typeface="Cambria Math" charset="0"/>
                           </a:rPr>
                         </m:ctrlPr>
                       </m:sSubSupPr>
@@ -7146,7 +7146,7 @@
                       <m:dPr>
                         <m:ctrlPr>
                           <a:rPr lang="en-US" sz="3600" i="1" smtClean="0">
-                            <a:latin typeface="Cambria Math" panose="02040503050406030204" pitchFamily="18" charset="0"/>
+                            <a:latin typeface="Cambria Math" charset="0"/>
                           </a:rPr>
                         </m:ctrlPr>
                       </m:dPr>
@@ -7169,7 +7169,7 @@
                       <m:dPr>
                         <m:ctrlPr>
                           <a:rPr lang="en-US" sz="3600" b="0" i="1" smtClean="0">
-                            <a:latin typeface="Cambria Math" panose="02040503050406030204" pitchFamily="18" charset="0"/>
+                            <a:latin typeface="Cambria Math" charset="0"/>
                           </a:rPr>
                         </m:ctrlPr>
                       </m:dPr>
@@ -7483,7 +7483,7 @@
                         <m:sSubSupPr>
                           <m:ctrlPr>
                             <a:rPr lang="en-US" sz="3000" i="1" smtClean="0">
-                              <a:latin typeface="Cambria Math" panose="02040503050406030204" pitchFamily="18" charset="0"/>
+                              <a:latin typeface="Cambria Math" charset="0"/>
                             </a:rPr>
                           </m:ctrlPr>
                         </m:sSubSupPr>
@@ -7528,7 +7528,7 @@
                         <m:dPr>
                           <m:ctrlPr>
                             <a:rPr lang="en-US" sz="3000" i="1">
-                              <a:latin typeface="Cambria Math" panose="02040503050406030204" pitchFamily="18" charset="0"/>
+                              <a:latin typeface="Cambria Math" charset="0"/>
                             </a:rPr>
                           </m:ctrlPr>
                         </m:dPr>
@@ -7551,7 +7551,7 @@
                         <m:sSubSupPr>
                           <m:ctrlPr>
                             <a:rPr lang="en-US" sz="3000" i="1">
-                              <a:latin typeface="Cambria Math" panose="02040503050406030204" pitchFamily="18" charset="0"/>
+                              <a:latin typeface="Cambria Math" charset="0"/>
                             </a:rPr>
                           </m:ctrlPr>
                         </m:sSubSupPr>
@@ -7586,7 +7586,7 @@
                           <m:endChr m:val="]"/>
                           <m:ctrlPr>
                             <a:rPr lang="en-US" sz="3000" i="1">
-                              <a:latin typeface="Cambria Math" panose="02040503050406030204" pitchFamily="18" charset="0"/>
+                              <a:latin typeface="Cambria Math" charset="0"/>
                             </a:rPr>
                           </m:ctrlPr>
                         </m:dPr>
@@ -7595,7 +7595,7 @@
                             <m:sSubSupPr>
                               <m:ctrlPr>
                                 <a:rPr lang="en-US" sz="3000" i="1">
-                                  <a:latin typeface="Cambria Math" panose="02040503050406030204" pitchFamily="18" charset="0"/>
+                                  <a:latin typeface="Cambria Math" charset="0"/>
                                 </a:rPr>
                               </m:ctrlPr>
                             </m:sSubSupPr>
@@ -7640,7 +7640,7 @@
                             <m:dPr>
                               <m:ctrlPr>
                                 <a:rPr lang="en-US" sz="3000" i="1">
-                                  <a:latin typeface="Cambria Math" panose="02040503050406030204" pitchFamily="18" charset="0"/>
+                                  <a:latin typeface="Cambria Math" charset="0"/>
                                 </a:rPr>
                               </m:ctrlPr>
                             </m:dPr>
@@ -8027,7 +8027,7 @@
                           <m:sSubSupPr>
                             <m:ctrlPr>
                               <a:rPr lang="en-US" i="1" smtClean="0">
-                                <a:latin typeface="Cambria Math" panose="02040503050406030204" pitchFamily="18" charset="0"/>
+                                <a:latin typeface="Cambria Math" charset="0"/>
                               </a:rPr>
                             </m:ctrlPr>
                           </m:sSubSupPr>
@@ -8060,7 +8060,7 @@
                           <m:dPr>
                             <m:ctrlPr>
                               <a:rPr lang="en-US" i="1" smtClean="0">
-                                <a:latin typeface="Cambria Math" panose="02040503050406030204" pitchFamily="18" charset="0"/>
+                                <a:latin typeface="Cambria Math" charset="0"/>
                               </a:rPr>
                             </m:ctrlPr>
                           </m:dPr>
@@ -8737,7 +8737,7 @@
                       <m:sSubSupPr>
                         <m:ctrlPr>
                           <a:rPr lang="en-US" sz="4000" i="1" smtClean="0">
-                            <a:latin typeface="Cambria Math" panose="02040503050406030204" pitchFamily="18" charset="0"/>
+                            <a:latin typeface="Cambria Math" charset="0"/>
                           </a:rPr>
                         </m:ctrlPr>
                       </m:sSubSupPr>
@@ -8770,7 +8770,7 @@
                       <m:dPr>
                         <m:ctrlPr>
                           <a:rPr lang="en-US" sz="4000" i="1" smtClean="0">
-                            <a:latin typeface="Cambria Math" panose="02040503050406030204" pitchFamily="18" charset="0"/>
+                            <a:latin typeface="Cambria Math" charset="0"/>
                           </a:rPr>
                         </m:ctrlPr>
                       </m:dPr>
@@ -8793,7 +8793,7 @@
                       <m:sSubSupPr>
                         <m:ctrlPr>
                           <a:rPr lang="en-US" sz="4000" b="0" i="1" smtClean="0">
-                            <a:latin typeface="Cambria Math" panose="02040503050406030204" pitchFamily="18" charset="0"/>
+                            <a:latin typeface="Cambria Math" charset="0"/>
                           </a:rPr>
                         </m:ctrlPr>
                       </m:sSubSupPr>
@@ -8818,7 +8818,7 @@
                           <m:dPr>
                             <m:ctrlPr>
                               <a:rPr lang="en-US" sz="4000" b="0" i="1" smtClean="0">
-                                <a:latin typeface="Cambria Math" panose="02040503050406030204" pitchFamily="18" charset="0"/>
+                                <a:latin typeface="Cambria Math" charset="0"/>
                               </a:rPr>
                             </m:ctrlPr>
                           </m:dPr>
@@ -8837,7 +8837,7 @@
                       <m:dPr>
                         <m:ctrlPr>
                           <a:rPr lang="en-US" sz="4000" b="0" i="1" smtClean="0">
-                            <a:latin typeface="Cambria Math" panose="02040503050406030204" pitchFamily="18" charset="0"/>
+                            <a:latin typeface="Cambria Math" charset="0"/>
                           </a:rPr>
                         </m:ctrlPr>
                       </m:dPr>
@@ -8970,7 +8970,7 @@
                           <m:sSubSupPr>
                             <m:ctrlPr>
                               <a:rPr lang="en-US" i="1" smtClean="0">
-                                <a:latin typeface="Cambria Math" panose="02040503050406030204" pitchFamily="18" charset="0"/>
+                                <a:latin typeface="Cambria Math" charset="0"/>
                               </a:rPr>
                             </m:ctrlPr>
                           </m:sSubSupPr>
@@ -9003,7 +9003,7 @@
                           <m:dPr>
                             <m:ctrlPr>
                               <a:rPr lang="en-US" i="1" smtClean="0">
-                                <a:latin typeface="Cambria Math" panose="02040503050406030204" pitchFamily="18" charset="0"/>
+                                <a:latin typeface="Cambria Math" charset="0"/>
                               </a:rPr>
                             </m:ctrlPr>
                           </m:dPr>
@@ -9224,7 +9224,7 @@
                           <m:sSubSupPr>
                             <m:ctrlPr>
                               <a:rPr lang="en-US" i="1" smtClean="0">
-                                <a:latin typeface="Cambria Math" panose="02040503050406030204" pitchFamily="18" charset="0"/>
+                                <a:latin typeface="Cambria Math" charset="0"/>
                               </a:rPr>
                             </m:ctrlPr>
                           </m:sSubSupPr>
@@ -9269,7 +9269,7 @@
                           <m:dPr>
                             <m:ctrlPr>
                               <a:rPr lang="en-US" i="1" smtClean="0">
-                                <a:latin typeface="Cambria Math" panose="02040503050406030204" pitchFamily="18" charset="0"/>
+                                <a:latin typeface="Cambria Math" charset="0"/>
                               </a:rPr>
                             </m:ctrlPr>
                           </m:dPr>
@@ -9409,7 +9409,7 @@
                           <m:sSubSupPr>
                             <m:ctrlPr>
                               <a:rPr lang="en-US" i="1" smtClean="0">
-                                <a:latin typeface="Cambria Math" panose="02040503050406030204" pitchFamily="18" charset="0"/>
+                                <a:latin typeface="Cambria Math" charset="0"/>
                               </a:rPr>
                             </m:ctrlPr>
                           </m:sSubSupPr>
@@ -9454,7 +9454,7 @@
                           <m:dPr>
                             <m:ctrlPr>
                               <a:rPr lang="en-US" i="1" smtClean="0">
-                                <a:latin typeface="Cambria Math" panose="02040503050406030204" pitchFamily="18" charset="0"/>
+                                <a:latin typeface="Cambria Math" charset="0"/>
                               </a:rPr>
                             </m:ctrlPr>
                           </m:dPr>
@@ -9996,7 +9996,7 @@
                         <m:sSubSupPr>
                           <m:ctrlPr>
                             <a:rPr lang="en-US" sz="3600" i="1" smtClean="0">
-                              <a:latin typeface="Cambria Math" panose="02040503050406030204" pitchFamily="18" charset="0"/>
+                              <a:latin typeface="Cambria Math" charset="0"/>
                             </a:rPr>
                           </m:ctrlPr>
                         </m:sSubSupPr>
@@ -10041,7 +10041,7 @@
                         <m:dPr>
                           <m:ctrlPr>
                             <a:rPr lang="en-US" sz="3600" i="1" smtClean="0">
-                              <a:latin typeface="Cambria Math" panose="02040503050406030204" pitchFamily="18" charset="0"/>
+                              <a:latin typeface="Cambria Math" charset="0"/>
                             </a:rPr>
                           </m:ctrlPr>
                         </m:dPr>
@@ -10064,7 +10064,7 @@
                         <m:sSubSupPr>
                           <m:ctrlPr>
                             <a:rPr lang="en-US" sz="3600" b="0" i="1" smtClean="0">
-                              <a:latin typeface="Cambria Math" panose="02040503050406030204" pitchFamily="18" charset="0"/>
+                              <a:latin typeface="Cambria Math" charset="0"/>
                             </a:rPr>
                           </m:ctrlPr>
                         </m:sSubSupPr>
@@ -10099,7 +10099,7 @@
                           <m:endChr m:val="]"/>
                           <m:ctrlPr>
                             <a:rPr lang="en-US" sz="3600" b="0" i="1" smtClean="0">
-                              <a:latin typeface="Cambria Math" panose="02040503050406030204" pitchFamily="18" charset="0"/>
+                              <a:latin typeface="Cambria Math" charset="0"/>
                             </a:rPr>
                           </m:ctrlPr>
                         </m:dPr>
@@ -10108,7 +10108,7 @@
                             <m:dPr>
                               <m:ctrlPr>
                                 <a:rPr lang="en-US" sz="3600" b="0" i="1" smtClean="0">
-                                  <a:latin typeface="Cambria Math" panose="02040503050406030204" pitchFamily="18" charset="0"/>
+                                  <a:latin typeface="Cambria Math" charset="0"/>
                                 </a:rPr>
                               </m:ctrlPr>
                             </m:dPr>
@@ -10914,7 +10914,7 @@
                         <m:dPr>
                           <m:ctrlPr>
                             <a:rPr lang="en-US" b="0" i="1" smtClean="0">
-                              <a:latin typeface="Cambria Math" panose="02040503050406030204" pitchFamily="18" charset="0"/>
+                              <a:latin typeface="Cambria Math" charset="0"/>
                             </a:rPr>
                           </m:ctrlPr>
                         </m:dPr>
@@ -10951,7 +10951,7 @@
                           <m:endChr m:val=""/>
                           <m:ctrlPr>
                             <a:rPr lang="en-US" b="0" i="1" smtClean="0">
-                              <a:latin typeface="Cambria Math" panose="02040503050406030204" pitchFamily="18" charset="0"/>
+                              <a:latin typeface="Cambria Math" charset="0"/>
                             </a:rPr>
                           </m:ctrlPr>
                         </m:dPr>
@@ -10960,7 +10960,7 @@
                             <m:eqArrPr>
                               <m:ctrlPr>
                                 <a:rPr lang="en-US" b="0" i="1" smtClean="0">
-                                  <a:latin typeface="Cambria Math" panose="02040503050406030204" pitchFamily="18" charset="0"/>
+                                  <a:latin typeface="Cambria Math" charset="0"/>
                                 </a:rPr>
                               </m:ctrlPr>
                             </m:eqArrPr>
@@ -10981,7 +10981,7 @@
                                 <m:dPr>
                                   <m:ctrlPr>
                                     <a:rPr lang="en-US" b="0" i="1" smtClean="0">
-                                      <a:latin typeface="Cambria Math" panose="02040503050406030204" pitchFamily="18" charset="0"/>
+                                      <a:latin typeface="Cambria Math" charset="0"/>
                                     </a:rPr>
                                   </m:ctrlPr>
                                 </m:dPr>
@@ -11126,7 +11126,7 @@
                       <m:sSupPr>
                         <m:ctrlPr>
                           <a:rPr lang="en-US" b="0" i="1" smtClean="0">
-                            <a:latin typeface="Cambria Math" panose="02040503050406030204" pitchFamily="18" charset="0"/>
+                            <a:latin typeface="Cambria Math" charset="0"/>
                           </a:rPr>
                         </m:ctrlPr>
                       </m:sSupPr>
@@ -11137,7 +11137,7 @@
                             <m:endChr m:val="]"/>
                             <m:ctrlPr>
                               <a:rPr lang="en-US" b="0" i="1" smtClean="0">
-                                <a:latin typeface="Cambria Math" panose="02040503050406030204" pitchFamily="18" charset="0"/>
+                                <a:latin typeface="Cambria Math" charset="0"/>
                               </a:rPr>
                             </m:ctrlPr>
                           </m:dPr>
@@ -11146,7 +11146,7 @@
                               <m:sSubSupPr>
                                 <m:ctrlPr>
                                   <a:rPr lang="en-US" b="0" i="1" smtClean="0">
-                                    <a:latin typeface="Cambria Math" panose="02040503050406030204" pitchFamily="18" charset="0"/>
+                                    <a:latin typeface="Cambria Math" charset="0"/>
                                   </a:rPr>
                                 </m:ctrlPr>
                               </m:sSubSupPr>
@@ -11163,7 +11163,7 @@
                                   <m:sSupPr>
                                     <m:ctrlPr>
                                       <a:rPr lang="en-US" b="0" i="1" smtClean="0">
-                                        <a:latin typeface="Cambria Math" panose="02040503050406030204" pitchFamily="18" charset="0"/>
+                                        <a:latin typeface="Cambria Math" charset="0"/>
                                       </a:rPr>
                                     </m:ctrlPr>
                                   </m:sSupPr>
@@ -11198,7 +11198,7 @@
                               <m:dPr>
                                 <m:ctrlPr>
                                   <a:rPr lang="en-US" b="0" i="1" smtClean="0">
-                                    <a:latin typeface="Cambria Math" panose="02040503050406030204" pitchFamily="18" charset="0"/>
+                                    <a:latin typeface="Cambria Math" charset="0"/>
                                   </a:rPr>
                                 </m:ctrlPr>
                               </m:dPr>
@@ -11616,7 +11616,7 @@
                           <m:sSupPr>
                             <m:ctrlPr>
                               <a:rPr lang="en-US" i="1" smtClean="0">
-                                <a:latin typeface="Cambria Math" panose="02040503050406030204" pitchFamily="18" charset="0"/>
+                                <a:latin typeface="Cambria Math" charset="0"/>
                               </a:rPr>
                             </m:ctrlPr>
                           </m:sSupPr>
@@ -11930,7 +11930,7 @@
                           <m:sSupPr>
                             <m:ctrlPr>
                               <a:rPr lang="en-US" i="1" smtClean="0">
-                                <a:latin typeface="Cambria Math" panose="02040503050406030204" pitchFamily="18" charset="0"/>
+                                <a:latin typeface="Cambria Math" charset="0"/>
                               </a:rPr>
                             </m:ctrlPr>
                           </m:sSupPr>
@@ -12490,8 +12490,8 @@
           </a:p>
         </p:txBody>
       </p:sp>
-      <mc:AlternateContent xmlns:mc="http://schemas.openxmlformats.org/markup-compatibility/2006">
-        <mc:Choice xmlns:a14="http://schemas.microsoft.com/office/drawing/2010/main" Requires="a14">
+      <mc:AlternateContent xmlns:mc="http://schemas.openxmlformats.org/markup-compatibility/2006" xmlns:a14="http://schemas.microsoft.com/office/drawing/2010/main">
+        <mc:Choice Requires="a14">
           <p:sp>
             <p:nvSpPr>
               <p:cNvPr id="24" name="Content Placeholder 23"/>
@@ -12545,7 +12545,7 @@
                         <m:dPr>
                           <m:ctrlPr>
                             <a:rPr lang="en-US" b="0" i="1" smtClean="0">
-                              <a:latin typeface="Cambria Math" panose="02040503050406030204" pitchFamily="18" charset="0"/>
+                              <a:latin typeface="Cambria Math" charset="0"/>
                             </a:rPr>
                           </m:ctrlPr>
                         </m:dPr>
@@ -12582,7 +12582,7 @@
                           <m:endChr m:val=""/>
                           <m:ctrlPr>
                             <a:rPr lang="en-US" b="0" i="1" smtClean="0">
-                              <a:latin typeface="Cambria Math" panose="02040503050406030204" pitchFamily="18" charset="0"/>
+                              <a:latin typeface="Cambria Math" charset="0"/>
                             </a:rPr>
                           </m:ctrlPr>
                         </m:dPr>
@@ -12591,7 +12591,7 @@
                             <m:eqArrPr>
                               <m:ctrlPr>
                                 <a:rPr lang="en-US" b="0" i="1" smtClean="0">
-                                  <a:latin typeface="Cambria Math" panose="02040503050406030204" pitchFamily="18" charset="0"/>
+                                  <a:latin typeface="Cambria Math" charset="0"/>
                                 </a:rPr>
                               </m:ctrlPr>
                             </m:eqArrPr>
@@ -12606,7 +12606,7 @@
                                 <m:dPr>
                                   <m:ctrlPr>
                                     <a:rPr lang="en-US" b="0" i="1" smtClean="0">
-                                      <a:latin typeface="Cambria Math" panose="02040503050406030204" pitchFamily="18" charset="0"/>
+                                      <a:latin typeface="Cambria Math" charset="0"/>
                                     </a:rPr>
                                   </m:ctrlPr>
                                 </m:dPr>
@@ -12739,23 +12739,7 @@
               <a:p>
                 <a:r>
                   <a:rPr lang="en-US" b="0" dirty="0" smtClean="0"/>
-                  <a:t>The result </a:t>
-                </a:r>
-                <a:r>
-                  <a:rPr lang="en-US" b="0" dirty="0" smtClean="0"/>
-                  <a:t>image with </a:t>
-                </a:r>
-                <a:r>
-                  <a:rPr lang="en-US" b="0" dirty="0" smtClean="0"/>
-                  <a:t>the </a:t>
-                </a:r>
-                <a:r>
-                  <a:rPr lang="en-US" b="0" dirty="0" smtClean="0"/>
-                  <a:t>clear border will </a:t>
-                </a:r>
-                <a:r>
-                  <a:rPr lang="en-US" b="0" dirty="0" smtClean="0"/>
-                  <a:t>be </a:t>
+                  <a:t>The result image with the clear border will be </a:t>
                 </a:r>
                 <a14:m>
                   <m:oMath xmlns:m="http://schemas.openxmlformats.org/officeDocument/2006/math">
@@ -12787,7 +12771,7 @@
                       <m:sSubSupPr>
                         <m:ctrlPr>
                           <a:rPr lang="en-US" b="0" i="1" smtClean="0">
-                            <a:latin typeface="Cambria Math" panose="02040503050406030204" pitchFamily="18" charset="0"/>
+                            <a:latin typeface="Cambria Math" charset="0"/>
                           </a:rPr>
                         </m:ctrlPr>
                       </m:sSubSupPr>
@@ -12820,7 +12804,7 @@
                       <m:dPr>
                         <m:ctrlPr>
                           <a:rPr lang="en-US" b="0" i="1" smtClean="0">
-                            <a:latin typeface="Cambria Math" panose="02040503050406030204" pitchFamily="18" charset="0"/>
+                            <a:latin typeface="Cambria Math" charset="0"/>
                           </a:rPr>
                         </m:ctrlPr>
                       </m:dPr>
@@ -12840,7 +12824,7 @@
             </p:txBody>
           </p:sp>
         </mc:Choice>
-        <mc:Fallback>
+        <mc:Fallback xmlns="">
           <p:sp>
             <p:nvSpPr>
               <p:cNvPr id="24" name="Content Placeholder 23"/>
@@ -13069,7 +13053,7 @@
                             <m:sSubSupPr>
                               <m:ctrlPr>
                                 <a:rPr lang="en-US" sz="2400" i="1" smtClean="0">
-                                  <a:latin typeface="Cambria Math" panose="02040503050406030204" pitchFamily="18" charset="0"/>
+                                  <a:latin typeface="Cambria Math" charset="0"/>
                                 </a:rPr>
                               </m:ctrlPr>
                             </m:sSubSupPr>
@@ -13102,7 +13086,7 @@
                             <m:dPr>
                               <m:ctrlPr>
                                 <a:rPr lang="en-US" sz="2400" i="1" smtClean="0">
-                                  <a:latin typeface="Cambria Math" panose="02040503050406030204" pitchFamily="18" charset="0"/>
+                                  <a:latin typeface="Cambria Math" charset="0"/>
                                 </a:rPr>
                               </m:ctrlPr>
                             </m:dPr>
@@ -13302,7 +13286,7 @@
                             <m:sSubSupPr>
                               <m:ctrlPr>
                                 <a:rPr lang="en-US" sz="2400" i="1" smtClean="0">
-                                  <a:latin typeface="Cambria Math" panose="02040503050406030204" pitchFamily="18" charset="0"/>
+                                  <a:latin typeface="Cambria Math" charset="0"/>
                                 </a:rPr>
                               </m:ctrlPr>
                             </m:sSubSupPr>
@@ -13335,7 +13319,7 @@
                             <m:dPr>
                               <m:ctrlPr>
                                 <a:rPr lang="en-US" sz="2400" i="1" smtClean="0">
-                                  <a:latin typeface="Cambria Math" panose="02040503050406030204" pitchFamily="18" charset="0"/>
+                                  <a:latin typeface="Cambria Math" charset="0"/>
                                 </a:rPr>
                               </m:ctrlPr>
                             </m:dPr>
@@ -14966,7 +14950,7 @@
                         <m:dPr>
                           <m:ctrlPr>
                             <a:rPr lang="en-US" b="0" i="1" smtClean="0">
-                              <a:latin typeface="Cambria Math" panose="02040503050406030204" pitchFamily="18" charset="0"/>
+                              <a:latin typeface="Cambria Math" charset="0"/>
                               <a:ea typeface="Cambria Math"/>
                             </a:rPr>
                           </m:ctrlPr>
@@ -14990,7 +14974,7 @@
                             <m:sSubPr>
                               <m:ctrlPr>
                                 <a:rPr lang="en-US" b="0" i="1" smtClean="0">
-                                  <a:latin typeface="Cambria Math" panose="02040503050406030204" pitchFamily="18" charset="0"/>
+                                  <a:latin typeface="Cambria Math" charset="0"/>
                                   <a:ea typeface="Cambria Math"/>
                                 </a:rPr>
                               </m:ctrlPr>
@@ -15027,7 +15011,7 @@
                         <m:dPr>
                           <m:ctrlPr>
                             <a:rPr lang="en-US" b="0" i="1" smtClean="0">
-                              <a:latin typeface="Cambria Math" panose="02040503050406030204" pitchFamily="18" charset="0"/>
+                              <a:latin typeface="Cambria Math" charset="0"/>
                               <a:ea typeface="Cambria Math"/>
                             </a:rPr>
                           </m:ctrlPr>
@@ -15037,7 +15021,7 @@
                             <m:sSupPr>
                               <m:ctrlPr>
                                 <a:rPr lang="en-US" b="0" i="1" smtClean="0">
-                                  <a:latin typeface="Cambria Math" panose="02040503050406030204" pitchFamily="18" charset="0"/>
+                                  <a:latin typeface="Cambria Math" charset="0"/>
                                   <a:ea typeface="Cambria Math"/>
                                 </a:rPr>
                               </m:ctrlPr>
@@ -15072,7 +15056,7 @@
                             <m:sSubPr>
                               <m:ctrlPr>
                                 <a:rPr lang="en-US" b="0" i="1" smtClean="0">
-                                  <a:latin typeface="Cambria Math" panose="02040503050406030204" pitchFamily="18" charset="0"/>
+                                  <a:latin typeface="Cambria Math" charset="0"/>
                                   <a:ea typeface="Cambria Math"/>
                                 </a:rPr>
                               </m:ctrlPr>
@@ -15136,7 +15120,7 @@
                       <m:dPr>
                         <m:ctrlPr>
                           <a:rPr lang="en-US" b="0" i="1" smtClean="0">
-                            <a:latin typeface="Cambria Math" panose="02040503050406030204" pitchFamily="18" charset="0"/>
+                            <a:latin typeface="Cambria Math" charset="0"/>
                             <a:ea typeface="Cambria Math"/>
                           </a:rPr>
                         </m:ctrlPr>
@@ -15160,7 +15144,7 @@
                           <m:sSubPr>
                             <m:ctrlPr>
                               <a:rPr lang="en-US" b="0" i="1" smtClean="0">
-                                <a:latin typeface="Cambria Math" panose="02040503050406030204" pitchFamily="18" charset="0"/>
+                                <a:latin typeface="Cambria Math" charset="0"/>
                                 <a:ea typeface="Cambria Math"/>
                               </a:rPr>
                             </m:ctrlPr>
@@ -15197,7 +15181,7 @@
                       <m:dPr>
                         <m:ctrlPr>
                           <a:rPr lang="en-US" b="0" i="1" smtClean="0">
-                            <a:latin typeface="Cambria Math" panose="02040503050406030204" pitchFamily="18" charset="0"/>
+                            <a:latin typeface="Cambria Math" charset="0"/>
                             <a:ea typeface="Cambria Math"/>
                           </a:rPr>
                         </m:ctrlPr>
@@ -15222,7 +15206,7 @@
                             <m:chr m:val="̂"/>
                             <m:ctrlPr>
                               <a:rPr lang="en-US" b="0" i="1" smtClean="0">
-                                <a:latin typeface="Cambria Math" panose="02040503050406030204" pitchFamily="18" charset="0"/>
+                                <a:latin typeface="Cambria Math" charset="0"/>
                                 <a:ea typeface="Cambria Math"/>
                               </a:rPr>
                             </m:ctrlPr>
@@ -15232,7 +15216,7 @@
                               <m:sSubPr>
                                 <m:ctrlPr>
                                   <a:rPr lang="en-US" b="0" i="1" smtClean="0">
-                                    <a:latin typeface="Cambria Math" panose="02040503050406030204" pitchFamily="18" charset="0"/>
+                                    <a:latin typeface="Cambria Math" charset="0"/>
                                     <a:ea typeface="Cambria Math"/>
                                   </a:rPr>
                                 </m:ctrlPr>
@@ -15532,7 +15516,7 @@
                         <m:dPr>
                           <m:ctrlPr>
                             <a:rPr lang="en-US" b="0" i="1" smtClean="0">
-                              <a:latin typeface="Cambria Math" panose="02040503050406030204" pitchFamily="18" charset="0"/>
+                              <a:latin typeface="Cambria Math" charset="0"/>
                               <a:ea typeface="Cambria Math"/>
                             </a:rPr>
                           </m:ctrlPr>
@@ -15549,7 +15533,7 @@
                             <m:dPr>
                               <m:ctrlPr>
                                 <a:rPr lang="en-US" b="0" i="1" smtClean="0">
-                                  <a:latin typeface="Cambria Math" panose="02040503050406030204" pitchFamily="18" charset="0"/>
+                                  <a:latin typeface="Cambria Math" charset="0"/>
                                   <a:ea typeface="Cambria Math"/>
                                 </a:rPr>
                               </m:ctrlPr>
@@ -15573,7 +15557,7 @@
                                 <m:sSubPr>
                                   <m:ctrlPr>
                                     <a:rPr lang="en-US" b="0" i="1" smtClean="0">
-                                      <a:latin typeface="Cambria Math" panose="02040503050406030204" pitchFamily="18" charset="0"/>
+                                      <a:latin typeface="Cambria Math" charset="0"/>
                                       <a:ea typeface="Cambria Math"/>
                                     </a:rPr>
                                   </m:ctrlPr>
@@ -15610,7 +15594,7 @@
                             <m:sSubPr>
                               <m:ctrlPr>
                                 <a:rPr lang="en-US" b="0" i="1" smtClean="0">
-                                  <a:latin typeface="Cambria Math" panose="02040503050406030204" pitchFamily="18" charset="0"/>
+                                  <a:latin typeface="Cambria Math" charset="0"/>
                                   <a:ea typeface="Cambria Math"/>
                                 </a:rPr>
                               </m:ctrlPr>
@@ -15647,7 +15631,7 @@
                         <m:sSubPr>
                           <m:ctrlPr>
                             <a:rPr lang="en-US" b="0" i="1" smtClean="0">
-                              <a:latin typeface="Cambria Math" panose="02040503050406030204" pitchFamily="18" charset="0"/>
+                              <a:latin typeface="Cambria Math" charset="0"/>
                               <a:ea typeface="Cambria Math"/>
                             </a:rPr>
                           </m:ctrlPr>
@@ -16000,7 +15984,7 @@
                         <m:sSubPr>
                           <m:ctrlPr>
                             <a:rPr lang="en-US" i="1">
-                              <a:latin typeface="Cambria Math" panose="02040503050406030204" pitchFamily="18" charset="0"/>
+                              <a:latin typeface="Cambria Math" charset="0"/>
                               <a:ea typeface="Cambria Math"/>
                             </a:rPr>
                           </m:ctrlPr>
@@ -16119,7 +16103,7 @@
                         <m:sSubPr>
                           <m:ctrlPr>
                             <a:rPr lang="en-US" i="1">
-                              <a:latin typeface="Cambria Math" panose="02040503050406030204" pitchFamily="18" charset="0"/>
+                              <a:latin typeface="Cambria Math" charset="0"/>
                               <a:ea typeface="Cambria Math"/>
                             </a:rPr>
                           </m:ctrlPr>
@@ -16232,7 +16216,7 @@
                         <m:dPr>
                           <m:ctrlPr>
                             <a:rPr lang="en-US" i="1">
-                              <a:latin typeface="Cambria Math" panose="02040503050406030204" pitchFamily="18" charset="0"/>
+                              <a:latin typeface="Cambria Math" charset="0"/>
                               <a:ea typeface="Cambria Math"/>
                             </a:rPr>
                           </m:ctrlPr>
@@ -16249,7 +16233,7 @@
                             <m:dPr>
                               <m:ctrlPr>
                                 <a:rPr lang="en-US" i="1">
-                                  <a:latin typeface="Cambria Math" panose="02040503050406030204" pitchFamily="18" charset="0"/>
+                                  <a:latin typeface="Cambria Math" charset="0"/>
                                   <a:ea typeface="Cambria Math"/>
                                 </a:rPr>
                               </m:ctrlPr>
@@ -16273,7 +16257,7 @@
                                 <m:sSubPr>
                                   <m:ctrlPr>
                                     <a:rPr lang="en-US" i="1">
-                                      <a:latin typeface="Cambria Math" panose="02040503050406030204" pitchFamily="18" charset="0"/>
+                                      <a:latin typeface="Cambria Math" charset="0"/>
                                       <a:ea typeface="Cambria Math"/>
                                     </a:rPr>
                                   </m:ctrlPr>
@@ -16310,7 +16294,7 @@
                             <m:sSubPr>
                               <m:ctrlPr>
                                 <a:rPr lang="en-US" i="1">
-                                  <a:latin typeface="Cambria Math" panose="02040503050406030204" pitchFamily="18" charset="0"/>
+                                  <a:latin typeface="Cambria Math" charset="0"/>
                                   <a:ea typeface="Cambria Math"/>
                                 </a:rPr>
                               </m:ctrlPr>
@@ -16347,7 +16331,7 @@
                         <m:sSubPr>
                           <m:ctrlPr>
                             <a:rPr lang="en-US" i="1">
-                              <a:latin typeface="Cambria Math" panose="02040503050406030204" pitchFamily="18" charset="0"/>
+                              <a:latin typeface="Cambria Math" charset="0"/>
                               <a:ea typeface="Cambria Math"/>
                             </a:rPr>
                           </m:ctrlPr>
@@ -16573,7 +16557,7 @@
                         <m:dPr>
                           <m:ctrlPr>
                             <a:rPr lang="en-US" i="1">
-                              <a:latin typeface="Cambria Math" panose="02040503050406030204" pitchFamily="18" charset="0"/>
+                              <a:latin typeface="Cambria Math" charset="0"/>
                               <a:ea typeface="Cambria Math"/>
                             </a:rPr>
                           </m:ctrlPr>
@@ -16590,7 +16574,7 @@
                             <m:dPr>
                               <m:ctrlPr>
                                 <a:rPr lang="en-US" i="1">
-                                  <a:latin typeface="Cambria Math" panose="02040503050406030204" pitchFamily="18" charset="0"/>
+                                  <a:latin typeface="Cambria Math" charset="0"/>
                                   <a:ea typeface="Cambria Math"/>
                                 </a:rPr>
                               </m:ctrlPr>
@@ -16614,7 +16598,7 @@
                                 <m:sSubPr>
                                   <m:ctrlPr>
                                     <a:rPr lang="en-US" i="1" smtClean="0">
-                                      <a:latin typeface="Cambria Math" panose="02040503050406030204" pitchFamily="18" charset="0"/>
+                                      <a:latin typeface="Cambria Math" charset="0"/>
                                       <a:ea typeface="Cambria Math"/>
                                     </a:rPr>
                                   </m:ctrlPr>
@@ -16651,7 +16635,7 @@
                             <m:sSubPr>
                               <m:ctrlPr>
                                 <a:rPr lang="en-US" i="1" smtClean="0">
-                                  <a:latin typeface="Cambria Math" panose="02040503050406030204" pitchFamily="18" charset="0"/>
+                                  <a:latin typeface="Cambria Math" charset="0"/>
                                   <a:ea typeface="Cambria Math"/>
                                 </a:rPr>
                               </m:ctrlPr>
@@ -16688,7 +16672,7 @@
                         <m:sSubPr>
                           <m:ctrlPr>
                             <a:rPr lang="en-US" i="1" smtClean="0">
-                              <a:latin typeface="Cambria Math" panose="02040503050406030204" pitchFamily="18" charset="0"/>
+                              <a:latin typeface="Cambria Math" charset="0"/>
                               <a:ea typeface="Cambria Math"/>
                             </a:rPr>
                           </m:ctrlPr>
@@ -17041,7 +17025,7 @@
                         <m:sSubPr>
                           <m:ctrlPr>
                             <a:rPr lang="en-US" i="1">
-                              <a:latin typeface="Cambria Math" panose="02040503050406030204" pitchFamily="18" charset="0"/>
+                              <a:latin typeface="Cambria Math" charset="0"/>
                               <a:ea typeface="Cambria Math"/>
                             </a:rPr>
                           </m:ctrlPr>
@@ -17160,7 +17144,7 @@
                         <m:sSubPr>
                           <m:ctrlPr>
                             <a:rPr lang="en-US" i="1">
-                              <a:latin typeface="Cambria Math" panose="02040503050406030204" pitchFamily="18" charset="0"/>
+                              <a:latin typeface="Cambria Math" charset="0"/>
                               <a:ea typeface="Cambria Math"/>
                             </a:rPr>
                           </m:ctrlPr>
@@ -17273,7 +17257,7 @@
                         <m:dPr>
                           <m:ctrlPr>
                             <a:rPr lang="en-US" i="1">
-                              <a:latin typeface="Cambria Math" panose="02040503050406030204" pitchFamily="18" charset="0"/>
+                              <a:latin typeface="Cambria Math" charset="0"/>
                               <a:ea typeface="Cambria Math"/>
                             </a:rPr>
                           </m:ctrlPr>
@@ -17290,7 +17274,7 @@
                             <m:dPr>
                               <m:ctrlPr>
                                 <a:rPr lang="en-US" i="1">
-                                  <a:latin typeface="Cambria Math" panose="02040503050406030204" pitchFamily="18" charset="0"/>
+                                  <a:latin typeface="Cambria Math" charset="0"/>
                                   <a:ea typeface="Cambria Math"/>
                                 </a:rPr>
                               </m:ctrlPr>
@@ -17314,7 +17298,7 @@
                                 <m:sSubPr>
                                   <m:ctrlPr>
                                     <a:rPr lang="en-US" i="1">
-                                      <a:latin typeface="Cambria Math" panose="02040503050406030204" pitchFamily="18" charset="0"/>
+                                      <a:latin typeface="Cambria Math" charset="0"/>
                                       <a:ea typeface="Cambria Math"/>
                                     </a:rPr>
                                   </m:ctrlPr>
@@ -17351,7 +17335,7 @@
                             <m:sSubPr>
                               <m:ctrlPr>
                                 <a:rPr lang="en-US" i="1">
-                                  <a:latin typeface="Cambria Math" panose="02040503050406030204" pitchFamily="18" charset="0"/>
+                                  <a:latin typeface="Cambria Math" charset="0"/>
                                   <a:ea typeface="Cambria Math"/>
                                 </a:rPr>
                               </m:ctrlPr>
@@ -17388,7 +17372,7 @@
                         <m:sSubPr>
                           <m:ctrlPr>
                             <a:rPr lang="en-US" i="1">
-                              <a:latin typeface="Cambria Math" panose="02040503050406030204" pitchFamily="18" charset="0"/>
+                              <a:latin typeface="Cambria Math" charset="0"/>
                               <a:ea typeface="Cambria Math"/>
                             </a:rPr>
                           </m:ctrlPr>
@@ -17544,8 +17528,8 @@
           <a:lstStyle/>
           <a:p>
             <a:r>
-              <a:rPr lang="en-US" dirty="0" err="1" smtClean="0"/>
-              <a:t>Skeletonization</a:t>
+              <a:rPr lang="en-US" dirty="0" smtClean="0"/>
+              <a:t>Skeletonizing</a:t>
             </a:r>
             <a:endParaRPr lang="en-US" dirty="0"/>
           </a:p>
@@ -17571,12 +17555,8 @@
               <a:t>Repeated </a:t>
             </a:r>
             <a:r>
-              <a:rPr lang="en-US" dirty="0" err="1"/>
-              <a:t>t</a:t>
-            </a:r>
-            <a:r>
-              <a:rPr lang="en-US" dirty="0" err="1" smtClean="0"/>
-              <a:t>hinnings</a:t>
+              <a:rPr lang="en-US" dirty="0" smtClean="0"/>
+              <a:t>thinning's</a:t>
             </a:r>
             <a:endParaRPr lang="en-US" dirty="0" smtClean="0"/>
           </a:p>
@@ -17694,7 +17674,12 @@
             <p:ph idx="1"/>
           </p:nvPr>
         </p:nvSpPr>
-        <p:spPr/>
+        <p:spPr>
+          <a:xfrm>
+            <a:off x="609600" y="1600207"/>
+            <a:ext cx="10972800" cy="1274796"/>
+          </a:xfrm>
+        </p:spPr>
         <p:txBody>
           <a:bodyPr/>
           <a:lstStyle/>
@@ -17710,23 +17695,809 @@
               <a:t>Complement to the </a:t>
             </a:r>
             <a:r>
-              <a:rPr lang="en-US" dirty="0" err="1" smtClean="0"/>
-              <a:t>skeletonization</a:t>
+              <a:rPr lang="en-US" dirty="0" smtClean="0"/>
+              <a:t>skeletonizing</a:t>
             </a:r>
             <a:endParaRPr lang="en-US" dirty="0"/>
           </a:p>
         </p:txBody>
       </p:sp>
+      <mc:AlternateContent xmlns:mc="http://schemas.openxmlformats.org/markup-compatibility/2006">
+        <mc:Choice xmlns:a14="http://schemas.microsoft.com/office/drawing/2010/main" Requires="a14">
+          <p:sp>
+            <p:nvSpPr>
+              <p:cNvPr id="8" name="Rectangle 7"/>
+              <p:cNvSpPr/>
+              <p:nvPr/>
+            </p:nvSpPr>
+            <p:spPr>
+              <a:xfrm>
+                <a:off x="2057400" y="3057572"/>
+                <a:ext cx="1676400" cy="369332"/>
+              </a:xfrm>
+              <a:prstGeom prst="rect">
+                <a:avLst/>
+              </a:prstGeom>
+            </p:spPr>
+            <p:txBody>
+              <a:bodyPr wrap="square">
+                <a:spAutoFit/>
+              </a:bodyPr>
+              <a:lstStyle/>
+              <a:p>
+                <a:pPr/>
+                <a14:m>
+                  <m:oMathPara xmlns:m="http://schemas.openxmlformats.org/officeDocument/2006/math">
+                    <m:oMathParaPr>
+                      <m:jc m:val="left"/>
+                    </m:oMathParaPr>
+                    <m:oMath xmlns:m="http://schemas.openxmlformats.org/officeDocument/2006/math">
+                      <m:sSub>
+                        <m:sSubPr>
+                          <m:ctrlPr>
+                            <a:rPr lang="en-US" i="1" smtClean="0">
+                              <a:latin typeface="Cambria Math" charset="0"/>
+                              <a:ea typeface="Cambria Math" charset="0"/>
+                              <a:cs typeface="Cambria Math" charset="0"/>
+                            </a:rPr>
+                          </m:ctrlPr>
+                        </m:sSubPr>
+                        <m:e>
+                          <m:r>
+                            <a:rPr lang="en-US" b="0" i="1" smtClean="0">
+                              <a:latin typeface="Cambria Math" charset="0"/>
+                              <a:ea typeface="Cambria Math" charset="0"/>
+                              <a:cs typeface="Cambria Math" charset="0"/>
+                            </a:rPr>
+                            <m:t>𝑋</m:t>
+                          </m:r>
+                        </m:e>
+                        <m:sub>
+                          <m:r>
+                            <a:rPr lang="en-US" b="0" i="1" smtClean="0">
+                              <a:latin typeface="Cambria Math" charset="0"/>
+                              <a:ea typeface="Cambria Math" charset="0"/>
+                              <a:cs typeface="Cambria Math" charset="0"/>
+                            </a:rPr>
+                            <m:t>1</m:t>
+                          </m:r>
+                        </m:sub>
+                      </m:sSub>
+                      <m:r>
+                        <a:rPr lang="en-US" b="0" i="1" smtClean="0">
+                          <a:latin typeface="Cambria Math" charset="0"/>
+                          <a:ea typeface="Cambria Math" charset="0"/>
+                          <a:cs typeface="Cambria Math" charset="0"/>
+                        </a:rPr>
+                        <m:t>=</m:t>
+                      </m:r>
+                      <m:r>
+                        <a:rPr lang="en-US" b="0" i="1" smtClean="0">
+                          <a:latin typeface="Cambria Math" charset="0"/>
+                          <a:ea typeface="Cambria Math" charset="0"/>
+                          <a:cs typeface="Cambria Math" charset="0"/>
+                        </a:rPr>
+                        <m:t>𝐴</m:t>
+                      </m:r>
+                      <m:r>
+                        <a:rPr lang="en-US" i="1">
+                          <a:latin typeface="Cambria Math" charset="0"/>
+                          <a:ea typeface="Cambria Math" charset="0"/>
+                          <a:cs typeface="Cambria Math" charset="0"/>
+                        </a:rPr>
+                        <m:t>⊗</m:t>
+                      </m:r>
+                      <m:r>
+                        <a:rPr lang="en-US" b="0" i="1" smtClean="0">
+                          <a:latin typeface="Cambria Math" charset="0"/>
+                          <a:ea typeface="Cambria Math" charset="0"/>
+                          <a:cs typeface="Cambria Math" charset="0"/>
+                        </a:rPr>
+                        <m:t>{</m:t>
+                      </m:r>
+                      <m:r>
+                        <a:rPr lang="en-US" b="0" i="1" smtClean="0">
+                          <a:latin typeface="Cambria Math" charset="0"/>
+                          <a:ea typeface="Cambria Math" charset="0"/>
+                          <a:cs typeface="Cambria Math" charset="0"/>
+                        </a:rPr>
+                        <m:t>𝐵</m:t>
+                      </m:r>
+                      <m:r>
+                        <a:rPr lang="en-US" b="0" i="1" smtClean="0">
+                          <a:latin typeface="Cambria Math" charset="0"/>
+                          <a:ea typeface="Cambria Math" charset="0"/>
+                          <a:cs typeface="Cambria Math" charset="0"/>
+                        </a:rPr>
+                        <m:t>}</m:t>
+                      </m:r>
+                    </m:oMath>
+                  </m:oMathPara>
+                </a14:m>
+                <a:endParaRPr lang="en-US" dirty="0">
+                  <a:latin typeface="Times New Roman" panose="02020603050405020304" pitchFamily="18" charset="0"/>
+                  <a:ea typeface="Cambria Math"/>
+                  <a:cs typeface="Times New Roman" panose="02020603050405020304" pitchFamily="18" charset="0"/>
+                </a:endParaRPr>
+              </a:p>
+            </p:txBody>
+          </p:sp>
+        </mc:Choice>
+        <mc:Fallback>
+          <p:sp>
+            <p:nvSpPr>
+              <p:cNvPr id="8" name="Rectangle 7"/>
+              <p:cNvSpPr>
+                <a:spLocks noRot="1" noChangeAspect="1" noMove="1" noResize="1" noEditPoints="1" noAdjustHandles="1" noChangeArrowheads="1" noChangeShapeType="1" noTextEdit="1"/>
+              </p:cNvSpPr>
+              <p:nvPr/>
+            </p:nvSpPr>
+            <p:spPr>
+              <a:xfrm>
+                <a:off x="2057400" y="3057572"/>
+                <a:ext cx="1676400" cy="369332"/>
+              </a:xfrm>
+              <a:prstGeom prst="rect">
+                <a:avLst/>
+              </a:prstGeom>
+              <a:blipFill rotWithShape="0">
+                <a:blip r:embed="rId2"/>
+                <a:stretch>
+                  <a:fillRect b="-15000"/>
+                </a:stretch>
+              </a:blipFill>
+            </p:spPr>
+            <p:txBody>
+              <a:bodyPr/>
+              <a:lstStyle/>
+              <a:p>
+                <a:r>
+                  <a:rPr lang="en-US">
+                    <a:noFill/>
+                  </a:rPr>
+                  <a:t> </a:t>
+                </a:r>
+              </a:p>
+            </p:txBody>
+          </p:sp>
+        </mc:Fallback>
+      </mc:AlternateContent>
+      <mc:AlternateContent xmlns:mc="http://schemas.openxmlformats.org/markup-compatibility/2006">
+        <mc:Choice xmlns:a14="http://schemas.microsoft.com/office/drawing/2010/main" Requires="a14">
+          <p:sp>
+            <p:nvSpPr>
+              <p:cNvPr id="9" name="Rectangle 8"/>
+              <p:cNvSpPr/>
+              <p:nvPr/>
+            </p:nvSpPr>
+            <p:spPr>
+              <a:xfrm>
+                <a:off x="2057400" y="3616489"/>
+                <a:ext cx="2209800" cy="875496"/>
+              </a:xfrm>
+              <a:prstGeom prst="rect">
+                <a:avLst/>
+              </a:prstGeom>
+            </p:spPr>
+            <p:txBody>
+              <a:bodyPr wrap="square">
+                <a:spAutoFit/>
+              </a:bodyPr>
+              <a:lstStyle/>
+              <a:p>
+                <a:pPr/>
+                <a14:m>
+                  <m:oMathPara xmlns:m="http://schemas.openxmlformats.org/officeDocument/2006/math">
+                    <m:oMathParaPr>
+                      <m:jc m:val="left"/>
+                    </m:oMathParaPr>
+                    <m:oMath xmlns:m="http://schemas.openxmlformats.org/officeDocument/2006/math">
+                      <m:sSub>
+                        <m:sSubPr>
+                          <m:ctrlPr>
+                            <a:rPr lang="en-US" i="1" smtClean="0">
+                              <a:latin typeface="Cambria Math" charset="0"/>
+                              <a:ea typeface="Cambria Math" charset="0"/>
+                              <a:cs typeface="Cambria Math" charset="0"/>
+                            </a:rPr>
+                          </m:ctrlPr>
+                        </m:sSubPr>
+                        <m:e>
+                          <m:r>
+                            <a:rPr lang="en-US" b="0" i="1" smtClean="0">
+                              <a:latin typeface="Cambria Math" charset="0"/>
+                              <a:ea typeface="Cambria Math" charset="0"/>
+                              <a:cs typeface="Cambria Math" charset="0"/>
+                            </a:rPr>
+                            <m:t>𝑋</m:t>
+                          </m:r>
+                        </m:e>
+                        <m:sub>
+                          <m:r>
+                            <a:rPr lang="en-US" b="0" i="1" smtClean="0">
+                              <a:latin typeface="Cambria Math" charset="0"/>
+                              <a:ea typeface="Cambria Math" charset="0"/>
+                              <a:cs typeface="Cambria Math" charset="0"/>
+                            </a:rPr>
+                            <m:t>2</m:t>
+                          </m:r>
+                        </m:sub>
+                      </m:sSub>
+                      <m:r>
+                        <a:rPr lang="en-US" b="0" i="1" smtClean="0">
+                          <a:latin typeface="Cambria Math" charset="0"/>
+                          <a:ea typeface="Cambria Math" charset="0"/>
+                          <a:cs typeface="Cambria Math" charset="0"/>
+                        </a:rPr>
+                        <m:t>=</m:t>
+                      </m:r>
+                      <m:nary>
+                        <m:naryPr>
+                          <m:chr m:val="⋃"/>
+                          <m:ctrlPr>
+                            <a:rPr lang="is-IS" b="0" i="1" smtClean="0">
+                              <a:latin typeface="Cambria Math" charset="0"/>
+                              <a:ea typeface="Cambria Math" charset="0"/>
+                              <a:cs typeface="Cambria Math" charset="0"/>
+                            </a:rPr>
+                          </m:ctrlPr>
+                        </m:naryPr>
+                        <m:sub>
+                          <m:r>
+                            <m:rPr>
+                              <m:brk m:alnAt="23"/>
+                            </m:rPr>
+                            <a:rPr lang="en-US" b="0" i="1" smtClean="0">
+                              <a:latin typeface="Cambria Math" charset="0"/>
+                              <a:ea typeface="Cambria Math" charset="0"/>
+                              <a:cs typeface="Cambria Math" charset="0"/>
+                            </a:rPr>
+                            <m:t>𝑘</m:t>
+                          </m:r>
+                          <m:r>
+                            <a:rPr lang="en-US" b="0" i="1" smtClean="0">
+                              <a:latin typeface="Cambria Math" charset="0"/>
+                              <a:ea typeface="Cambria Math" charset="0"/>
+                              <a:cs typeface="Cambria Math" charset="0"/>
+                            </a:rPr>
+                            <m:t>=1</m:t>
+                          </m:r>
+                        </m:sub>
+                        <m:sup>
+                          <m:r>
+                            <a:rPr lang="en-US" b="0" i="1" smtClean="0">
+                              <a:latin typeface="Cambria Math" charset="0"/>
+                              <a:ea typeface="Cambria Math" charset="0"/>
+                              <a:cs typeface="Cambria Math" charset="0"/>
+                            </a:rPr>
+                            <m:t>8</m:t>
+                          </m:r>
+                        </m:sup>
+                        <m:e>
+                          <m:d>
+                            <m:dPr>
+                              <m:ctrlPr>
+                                <a:rPr lang="mr-IN" b="0" i="1" smtClean="0">
+                                  <a:latin typeface="Cambria Math" charset="0"/>
+                                  <a:ea typeface="Cambria Math" charset="0"/>
+                                  <a:cs typeface="Cambria Math" charset="0"/>
+                                </a:rPr>
+                              </m:ctrlPr>
+                            </m:dPr>
+                            <m:e>
+                              <m:sSub>
+                                <m:sSubPr>
+                                  <m:ctrlPr>
+                                    <a:rPr lang="en-US" b="0" i="1" smtClean="0">
+                                      <a:latin typeface="Cambria Math" charset="0"/>
+                                      <a:ea typeface="Cambria Math" charset="0"/>
+                                      <a:cs typeface="Cambria Math" charset="0"/>
+                                    </a:rPr>
+                                  </m:ctrlPr>
+                                </m:sSubPr>
+                                <m:e>
+                                  <m:r>
+                                    <a:rPr lang="en-US" b="0" i="1" smtClean="0">
+                                      <a:latin typeface="Cambria Math" charset="0"/>
+                                      <a:ea typeface="Cambria Math" charset="0"/>
+                                      <a:cs typeface="Cambria Math" charset="0"/>
+                                    </a:rPr>
+                                    <m:t>𝑋</m:t>
+                                  </m:r>
+                                </m:e>
+                                <m:sub>
+                                  <m:r>
+                                    <a:rPr lang="en-US" b="0" i="1" smtClean="0">
+                                      <a:latin typeface="Cambria Math" charset="0"/>
+                                      <a:ea typeface="Cambria Math" charset="0"/>
+                                      <a:cs typeface="Cambria Math" charset="0"/>
+                                    </a:rPr>
+                                    <m:t>1</m:t>
+                                  </m:r>
+                                </m:sub>
+                              </m:sSub>
+                              <m:r>
+                                <a:rPr lang="en-US" i="1">
+                                  <a:latin typeface="Cambria Math"/>
+                                  <a:ea typeface="Cambria Math"/>
+                                </a:rPr>
+                                <m:t>⊛</m:t>
+                              </m:r>
+                              <m:sSup>
+                                <m:sSupPr>
+                                  <m:ctrlPr>
+                                    <a:rPr lang="en-US" i="1" smtClean="0">
+                                      <a:latin typeface="Cambria Math" charset="0"/>
+                                      <a:ea typeface="Cambria Math"/>
+                                    </a:rPr>
+                                  </m:ctrlPr>
+                                </m:sSupPr>
+                                <m:e>
+                                  <m:r>
+                                    <a:rPr lang="en-US" b="0" i="1" smtClean="0">
+                                      <a:latin typeface="Cambria Math" charset="0"/>
+                                      <a:ea typeface="Cambria Math"/>
+                                    </a:rPr>
+                                    <m:t>𝐵</m:t>
+                                  </m:r>
+                                </m:e>
+                                <m:sup>
+                                  <m:r>
+                                    <a:rPr lang="en-US" b="0" i="1" smtClean="0">
+                                      <a:latin typeface="Cambria Math" charset="0"/>
+                                      <a:ea typeface="Cambria Math"/>
+                                    </a:rPr>
+                                    <m:t>𝑘</m:t>
+                                  </m:r>
+                                </m:sup>
+                              </m:sSup>
+                            </m:e>
+                          </m:d>
+                        </m:e>
+                      </m:nary>
+                    </m:oMath>
+                  </m:oMathPara>
+                </a14:m>
+                <a:endParaRPr lang="en-US" dirty="0">
+                  <a:latin typeface="Times New Roman" panose="02020603050405020304" pitchFamily="18" charset="0"/>
+                  <a:ea typeface="Cambria Math"/>
+                  <a:cs typeface="Times New Roman" panose="02020603050405020304" pitchFamily="18" charset="0"/>
+                </a:endParaRPr>
+              </a:p>
+            </p:txBody>
+          </p:sp>
+        </mc:Choice>
+        <mc:Fallback>
+          <p:sp>
+            <p:nvSpPr>
+              <p:cNvPr id="9" name="Rectangle 8"/>
+              <p:cNvSpPr>
+                <a:spLocks noRot="1" noChangeAspect="1" noMove="1" noResize="1" noEditPoints="1" noAdjustHandles="1" noChangeArrowheads="1" noChangeShapeType="1" noTextEdit="1"/>
+              </p:cNvSpPr>
+              <p:nvPr/>
+            </p:nvSpPr>
+            <p:spPr>
+              <a:xfrm>
+                <a:off x="2057400" y="3616489"/>
+                <a:ext cx="2209800" cy="875496"/>
+              </a:xfrm>
+              <a:prstGeom prst="rect">
+                <a:avLst/>
+              </a:prstGeom>
+              <a:blipFill rotWithShape="0">
+                <a:blip r:embed="rId3"/>
+                <a:stretch>
+                  <a:fillRect/>
+                </a:stretch>
+              </a:blipFill>
+            </p:spPr>
+            <p:txBody>
+              <a:bodyPr/>
+              <a:lstStyle/>
+              <a:p>
+                <a:r>
+                  <a:rPr lang="en-US">
+                    <a:noFill/>
+                  </a:rPr>
+                  <a:t> </a:t>
+                </a:r>
+              </a:p>
+            </p:txBody>
+          </p:sp>
+        </mc:Fallback>
+      </mc:AlternateContent>
+      <mc:AlternateContent xmlns:mc="http://schemas.openxmlformats.org/markup-compatibility/2006">
+        <mc:Choice xmlns:a14="http://schemas.microsoft.com/office/drawing/2010/main" Requires="a14">
+          <p:sp>
+            <p:nvSpPr>
+              <p:cNvPr id="10" name="Rectangle 9"/>
+              <p:cNvSpPr/>
+              <p:nvPr/>
+            </p:nvSpPr>
+            <p:spPr>
+              <a:xfrm>
+                <a:off x="2057400" y="5240487"/>
+                <a:ext cx="1524000" cy="369332"/>
+              </a:xfrm>
+              <a:prstGeom prst="rect">
+                <a:avLst/>
+              </a:prstGeom>
+            </p:spPr>
+            <p:txBody>
+              <a:bodyPr wrap="square">
+                <a:spAutoFit/>
+              </a:bodyPr>
+              <a:lstStyle/>
+              <a:p>
+                <a:pPr/>
+                <a14:m>
+                  <m:oMathPara xmlns:m="http://schemas.openxmlformats.org/officeDocument/2006/math">
+                    <m:oMathParaPr>
+                      <m:jc m:val="left"/>
+                    </m:oMathParaPr>
+                    <m:oMath xmlns:m="http://schemas.openxmlformats.org/officeDocument/2006/math">
+                      <m:sSub>
+                        <m:sSubPr>
+                          <m:ctrlPr>
+                            <a:rPr lang="en-US" i="1" smtClean="0">
+                              <a:latin typeface="Cambria Math" charset="0"/>
+                              <a:ea typeface="Cambria Math" charset="0"/>
+                              <a:cs typeface="Cambria Math" charset="0"/>
+                            </a:rPr>
+                          </m:ctrlPr>
+                        </m:sSubPr>
+                        <m:e>
+                          <m:r>
+                            <a:rPr lang="en-US" b="0" i="1" smtClean="0">
+                              <a:latin typeface="Cambria Math" charset="0"/>
+                              <a:ea typeface="Cambria Math" charset="0"/>
+                              <a:cs typeface="Cambria Math" charset="0"/>
+                            </a:rPr>
+                            <m:t>𝑋</m:t>
+                          </m:r>
+                        </m:e>
+                        <m:sub>
+                          <m:r>
+                            <a:rPr lang="en-US" b="0" i="1" smtClean="0">
+                              <a:latin typeface="Cambria Math" charset="0"/>
+                              <a:ea typeface="Cambria Math" charset="0"/>
+                              <a:cs typeface="Cambria Math" charset="0"/>
+                            </a:rPr>
+                            <m:t>4</m:t>
+                          </m:r>
+                        </m:sub>
+                      </m:sSub>
+                      <m:r>
+                        <a:rPr lang="en-US" b="0" i="1" smtClean="0">
+                          <a:latin typeface="Cambria Math" charset="0"/>
+                          <a:ea typeface="Cambria Math" charset="0"/>
+                          <a:cs typeface="Cambria Math" charset="0"/>
+                        </a:rPr>
+                        <m:t>=</m:t>
+                      </m:r>
+                      <m:sSub>
+                        <m:sSubPr>
+                          <m:ctrlPr>
+                            <a:rPr lang="en-US" b="0" i="1" smtClean="0">
+                              <a:latin typeface="Cambria Math" charset="0"/>
+                              <a:ea typeface="Cambria Math" charset="0"/>
+                              <a:cs typeface="Cambria Math" charset="0"/>
+                            </a:rPr>
+                          </m:ctrlPr>
+                        </m:sSubPr>
+                        <m:e>
+                          <m:r>
+                            <a:rPr lang="en-US" b="0" i="1" smtClean="0">
+                              <a:latin typeface="Cambria Math" charset="0"/>
+                              <a:ea typeface="Cambria Math" charset="0"/>
+                              <a:cs typeface="Cambria Math" charset="0"/>
+                            </a:rPr>
+                            <m:t>𝑋</m:t>
+                          </m:r>
+                        </m:e>
+                        <m:sub>
+                          <m:r>
+                            <a:rPr lang="en-US" b="0" i="1" smtClean="0">
+                              <a:latin typeface="Cambria Math" charset="0"/>
+                              <a:ea typeface="Cambria Math" charset="0"/>
+                              <a:cs typeface="Cambria Math" charset="0"/>
+                            </a:rPr>
+                            <m:t>1</m:t>
+                          </m:r>
+                        </m:sub>
+                      </m:sSub>
+                      <m:sSub>
+                        <m:sSubPr>
+                          <m:ctrlPr>
+                            <a:rPr lang="en-US" b="0" i="1" smtClean="0">
+                              <a:latin typeface="Cambria Math" charset="0"/>
+                              <a:ea typeface="Cambria Math" charset="0"/>
+                              <a:cs typeface="Cambria Math" charset="0"/>
+                            </a:rPr>
+                          </m:ctrlPr>
+                        </m:sSubPr>
+                        <m:e>
+                          <m:r>
+                            <a:rPr lang="en-US" b="0" i="1" smtClean="0">
+                              <a:latin typeface="Cambria Math" charset="0"/>
+                              <a:ea typeface="Cambria Math" charset="0"/>
+                              <a:cs typeface="Cambria Math" charset="0"/>
+                            </a:rPr>
+                            <m:t>∪</m:t>
+                          </m:r>
+                          <m:r>
+                            <a:rPr lang="en-US" b="0" i="1" smtClean="0">
+                              <a:latin typeface="Cambria Math" charset="0"/>
+                              <a:ea typeface="Cambria Math" charset="0"/>
+                              <a:cs typeface="Cambria Math" charset="0"/>
+                            </a:rPr>
+                            <m:t>𝑋</m:t>
+                          </m:r>
+                        </m:e>
+                        <m:sub>
+                          <m:r>
+                            <a:rPr lang="en-US" b="0" i="1" smtClean="0">
+                              <a:latin typeface="Cambria Math" charset="0"/>
+                              <a:ea typeface="Cambria Math" charset="0"/>
+                              <a:cs typeface="Cambria Math" charset="0"/>
+                            </a:rPr>
+                            <m:t>3</m:t>
+                          </m:r>
+                        </m:sub>
+                      </m:sSub>
+                    </m:oMath>
+                  </m:oMathPara>
+                </a14:m>
+                <a:endParaRPr lang="en-US" dirty="0">
+                  <a:latin typeface="Times New Roman" panose="02020603050405020304" pitchFamily="18" charset="0"/>
+                  <a:ea typeface="Cambria Math"/>
+                  <a:cs typeface="Times New Roman" panose="02020603050405020304" pitchFamily="18" charset="0"/>
+                </a:endParaRPr>
+              </a:p>
+            </p:txBody>
+          </p:sp>
+        </mc:Choice>
+        <mc:Fallback>
+          <p:sp>
+            <p:nvSpPr>
+              <p:cNvPr id="10" name="Rectangle 9"/>
+              <p:cNvSpPr>
+                <a:spLocks noRot="1" noChangeAspect="1" noMove="1" noResize="1" noEditPoints="1" noAdjustHandles="1" noChangeArrowheads="1" noChangeShapeType="1" noTextEdit="1"/>
+              </p:cNvSpPr>
+              <p:nvPr/>
+            </p:nvSpPr>
+            <p:spPr>
+              <a:xfrm>
+                <a:off x="2057400" y="5240487"/>
+                <a:ext cx="1524000" cy="369332"/>
+              </a:xfrm>
+              <a:prstGeom prst="rect">
+                <a:avLst/>
+              </a:prstGeom>
+              <a:blipFill rotWithShape="0">
+                <a:blip r:embed="rId4"/>
+                <a:stretch>
+                  <a:fillRect b="-1667"/>
+                </a:stretch>
+              </a:blipFill>
+            </p:spPr>
+            <p:txBody>
+              <a:bodyPr/>
+              <a:lstStyle/>
+              <a:p>
+                <a:r>
+                  <a:rPr lang="en-US">
+                    <a:noFill/>
+                  </a:rPr>
+                  <a:t> </a:t>
+                </a:r>
+              </a:p>
+            </p:txBody>
+          </p:sp>
+        </mc:Fallback>
+      </mc:AlternateContent>
+      <mc:AlternateContent xmlns:mc="http://schemas.openxmlformats.org/markup-compatibility/2006">
+        <mc:Choice xmlns:a14="http://schemas.microsoft.com/office/drawing/2010/main" Requires="a14">
+          <p:sp>
+            <p:nvSpPr>
+              <p:cNvPr id="11" name="Rectangle 10"/>
+              <p:cNvSpPr/>
+              <p:nvPr/>
+            </p:nvSpPr>
+            <p:spPr>
+              <a:xfrm>
+                <a:off x="2057400" y="4681570"/>
+                <a:ext cx="2322286" cy="369332"/>
+              </a:xfrm>
+              <a:prstGeom prst="rect">
+                <a:avLst/>
+              </a:prstGeom>
+            </p:spPr>
+            <p:txBody>
+              <a:bodyPr wrap="square">
+                <a:spAutoFit/>
+              </a:bodyPr>
+              <a:lstStyle/>
+              <a:p>
+                <a:pPr/>
+                <a14:m>
+                  <m:oMathPara xmlns:m="http://schemas.openxmlformats.org/officeDocument/2006/math">
+                    <m:oMathParaPr>
+                      <m:jc m:val="left"/>
+                    </m:oMathParaPr>
+                    <m:oMath xmlns:m="http://schemas.openxmlformats.org/officeDocument/2006/math">
+                      <m:sSub>
+                        <m:sSubPr>
+                          <m:ctrlPr>
+                            <a:rPr lang="en-US" i="1" smtClean="0">
+                              <a:latin typeface="Cambria Math" charset="0"/>
+                              <a:ea typeface="Cambria Math" charset="0"/>
+                              <a:cs typeface="Cambria Math" charset="0"/>
+                            </a:rPr>
+                          </m:ctrlPr>
+                        </m:sSubPr>
+                        <m:e>
+                          <m:r>
+                            <a:rPr lang="en-US" b="0" i="1" smtClean="0">
+                              <a:latin typeface="Cambria Math" charset="0"/>
+                              <a:ea typeface="Cambria Math" charset="0"/>
+                              <a:cs typeface="Cambria Math" charset="0"/>
+                            </a:rPr>
+                            <m:t>𝑋</m:t>
+                          </m:r>
+                        </m:e>
+                        <m:sub>
+                          <m:r>
+                            <a:rPr lang="en-US" b="0" i="1" smtClean="0">
+                              <a:latin typeface="Cambria Math" charset="0"/>
+                              <a:ea typeface="Cambria Math" charset="0"/>
+                              <a:cs typeface="Cambria Math" charset="0"/>
+                            </a:rPr>
+                            <m:t>3</m:t>
+                          </m:r>
+                        </m:sub>
+                      </m:sSub>
+                      <m:r>
+                        <a:rPr lang="en-US" b="0" i="1" smtClean="0">
+                          <a:latin typeface="Cambria Math" charset="0"/>
+                          <a:ea typeface="Cambria Math" charset="0"/>
+                          <a:cs typeface="Cambria Math" charset="0"/>
+                        </a:rPr>
+                        <m:t>=</m:t>
+                      </m:r>
+                      <m:d>
+                        <m:dPr>
+                          <m:ctrlPr>
+                            <a:rPr lang="mr-IN" b="0" i="1" smtClean="0">
+                              <a:latin typeface="Cambria Math" charset="0"/>
+                              <a:ea typeface="Cambria Math" charset="0"/>
+                              <a:cs typeface="Cambria Math" charset="0"/>
+                            </a:rPr>
+                          </m:ctrlPr>
+                        </m:dPr>
+                        <m:e>
+                          <m:sSub>
+                            <m:sSubPr>
+                              <m:ctrlPr>
+                                <a:rPr lang="en-US" b="0" i="1" smtClean="0">
+                                  <a:latin typeface="Cambria Math" charset="0"/>
+                                  <a:ea typeface="Cambria Math" charset="0"/>
+                                  <a:cs typeface="Cambria Math" charset="0"/>
+                                </a:rPr>
+                              </m:ctrlPr>
+                            </m:sSubPr>
+                            <m:e>
+                              <m:r>
+                                <a:rPr lang="en-US" b="0" i="1" smtClean="0">
+                                  <a:latin typeface="Cambria Math" charset="0"/>
+                                  <a:ea typeface="Cambria Math" charset="0"/>
+                                  <a:cs typeface="Cambria Math" charset="0"/>
+                                </a:rPr>
+                                <m:t>𝑋</m:t>
+                              </m:r>
+                            </m:e>
+                            <m:sub>
+                              <m:r>
+                                <a:rPr lang="en-US" b="0" i="1" smtClean="0">
+                                  <a:latin typeface="Cambria Math" charset="0"/>
+                                  <a:ea typeface="Cambria Math" charset="0"/>
+                                  <a:cs typeface="Cambria Math" charset="0"/>
+                                </a:rPr>
+                                <m:t>2</m:t>
+                              </m:r>
+                            </m:sub>
+                          </m:sSub>
+                          <m:r>
+                            <a:rPr lang="en-US" i="1">
+                              <a:latin typeface="Cambria Math"/>
+                              <a:ea typeface="Cambria Math"/>
+                            </a:rPr>
+                            <m:t>⊕</m:t>
+                          </m:r>
+                          <m:r>
+                            <a:rPr lang="en-US" b="0" i="1" smtClean="0">
+                              <a:latin typeface="Cambria Math" charset="0"/>
+                              <a:ea typeface="Cambria Math"/>
+                            </a:rPr>
+                            <m:t>𝐻</m:t>
+                          </m:r>
+                        </m:e>
+                      </m:d>
+                      <m:r>
+                        <a:rPr lang="en-US" i="1">
+                          <a:latin typeface="Cambria Math"/>
+                          <a:ea typeface="Cambria Math"/>
+                        </a:rPr>
+                        <m:t>∩</m:t>
+                      </m:r>
+                      <m:r>
+                        <a:rPr lang="en-US" b="0" i="1" smtClean="0">
+                          <a:latin typeface="Cambria Math" charset="0"/>
+                          <a:ea typeface="Cambria Math"/>
+                        </a:rPr>
+                        <m:t>𝐴</m:t>
+                      </m:r>
+                    </m:oMath>
+                  </m:oMathPara>
+                </a14:m>
+                <a:endParaRPr lang="en-US" dirty="0">
+                  <a:latin typeface="Times New Roman" panose="02020603050405020304" pitchFamily="18" charset="0"/>
+                  <a:ea typeface="Cambria Math"/>
+                  <a:cs typeface="Times New Roman" panose="02020603050405020304" pitchFamily="18" charset="0"/>
+                </a:endParaRPr>
+              </a:p>
+            </p:txBody>
+          </p:sp>
+        </mc:Choice>
+        <mc:Fallback>
+          <p:sp>
+            <p:nvSpPr>
+              <p:cNvPr id="11" name="Rectangle 10"/>
+              <p:cNvSpPr>
+                <a:spLocks noRot="1" noChangeAspect="1" noMove="1" noResize="1" noEditPoints="1" noAdjustHandles="1" noChangeArrowheads="1" noChangeShapeType="1" noTextEdit="1"/>
+              </p:cNvSpPr>
+              <p:nvPr/>
+            </p:nvSpPr>
+            <p:spPr>
+              <a:xfrm>
+                <a:off x="2057400" y="4681570"/>
+                <a:ext cx="2322286" cy="369332"/>
+              </a:xfrm>
+              <a:prstGeom prst="rect">
+                <a:avLst/>
+              </a:prstGeom>
+              <a:blipFill rotWithShape="0">
+                <a:blip r:embed="rId5"/>
+                <a:stretch>
+                  <a:fillRect b="-6557"/>
+                </a:stretch>
+              </a:blipFill>
+            </p:spPr>
+            <p:txBody>
+              <a:bodyPr/>
+              <a:lstStyle/>
+              <a:p>
+                <a:r>
+                  <a:rPr lang="en-US">
+                    <a:noFill/>
+                  </a:rPr>
+                  <a:t> </a:t>
+                </a:r>
+              </a:p>
+            </p:txBody>
+          </p:sp>
+        </mc:Fallback>
+      </mc:AlternateContent>
       <p:pic>
         <p:nvPicPr>
-          <p:cNvPr id="4" name="Picture 3"/>
+          <p:cNvPr id="12" name="Picture 11"/>
           <p:cNvPicPr>
             <a:picLocks noChangeAspect="1"/>
           </p:cNvPicPr>
           <p:nvPr/>
         </p:nvPicPr>
         <p:blipFill>
-          <a:blip r:embed="rId2">
+          <a:blip r:embed="rId6">
             <a:extLst>
               <a:ext uri="{28A0092B-C50C-407E-A947-70E740481C1C}">
                 <a14:useLocalDpi xmlns:a14="http://schemas.microsoft.com/office/drawing/2010/main" val="0"/>
@@ -17739,98 +18510,8 @@
         </p:blipFill>
         <p:spPr>
           <a:xfrm>
-            <a:off x="7010400" y="3429000"/>
-            <a:ext cx="3962400" cy="2971800"/>
-          </a:xfrm>
-          <a:prstGeom prst="rect">
-            <a:avLst/>
-          </a:prstGeom>
-        </p:spPr>
-      </p:pic>
-      <p:pic>
-        <p:nvPicPr>
-          <p:cNvPr id="5" name="Picture 4"/>
-          <p:cNvPicPr>
-            <a:picLocks noChangeAspect="1"/>
-          </p:cNvPicPr>
-          <p:nvPr/>
-        </p:nvPicPr>
-        <p:blipFill>
-          <a:blip r:embed="rId3">
-            <a:extLst>
-              <a:ext uri="{28A0092B-C50C-407E-A947-70E740481C1C}">
-                <a14:useLocalDpi xmlns:a14="http://schemas.microsoft.com/office/drawing/2010/main" val="0"/>
-              </a:ext>
-            </a:extLst>
-          </a:blip>
-          <a:stretch>
-            <a:fillRect/>
-          </a:stretch>
-        </p:blipFill>
-        <p:spPr>
-          <a:xfrm>
-            <a:off x="1219200" y="3429000"/>
-            <a:ext cx="3962400" cy="2971800"/>
-          </a:xfrm>
-          <a:prstGeom prst="rect">
-            <a:avLst/>
-          </a:prstGeom>
-        </p:spPr>
-      </p:pic>
-      <p:pic>
-        <p:nvPicPr>
-          <p:cNvPr id="6" name="Picture 5"/>
-          <p:cNvPicPr>
-            <a:picLocks noChangeAspect="1"/>
-          </p:cNvPicPr>
-          <p:nvPr/>
-        </p:nvPicPr>
-        <p:blipFill>
-          <a:blip r:embed="rId2">
-            <a:extLst>
-              <a:ext uri="{28A0092B-C50C-407E-A947-70E740481C1C}">
-                <a14:useLocalDpi xmlns:a14="http://schemas.microsoft.com/office/drawing/2010/main" val="0"/>
-              </a:ext>
-            </a:extLst>
-          </a:blip>
-          <a:stretch>
-            <a:fillRect/>
-          </a:stretch>
-        </p:blipFill>
-        <p:spPr>
-          <a:xfrm>
-            <a:off x="7010400" y="3395133"/>
-            <a:ext cx="3962400" cy="2971800"/>
-          </a:xfrm>
-          <a:prstGeom prst="rect">
-            <a:avLst/>
-          </a:prstGeom>
-        </p:spPr>
-      </p:pic>
-      <p:pic>
-        <p:nvPicPr>
-          <p:cNvPr id="7" name="Picture 6"/>
-          <p:cNvPicPr>
-            <a:picLocks noChangeAspect="1"/>
-          </p:cNvPicPr>
-          <p:nvPr/>
-        </p:nvPicPr>
-        <p:blipFill>
-          <a:blip r:embed="rId3">
-            <a:extLst>
-              <a:ext uri="{28A0092B-C50C-407E-A947-70E740481C1C}">
-                <a14:useLocalDpi xmlns:a14="http://schemas.microsoft.com/office/drawing/2010/main" val="0"/>
-              </a:ext>
-            </a:extLst>
-          </a:blip>
-          <a:stretch>
-            <a:fillRect/>
-          </a:stretch>
-        </p:blipFill>
-        <p:spPr>
-          <a:xfrm>
-            <a:off x="1219200" y="3395133"/>
-            <a:ext cx="3962400" cy="2971800"/>
+            <a:off x="7391400" y="3059668"/>
+            <a:ext cx="2709423" cy="2819400"/>
           </a:xfrm>
           <a:prstGeom prst="rect">
             <a:avLst/>
@@ -17899,9 +18580,9 @@
       </p:sp>
       <p:pic>
         <p:nvPicPr>
-          <p:cNvPr id="1026" name="Picture 2" descr="https://lh4.googleusercontent.com/k5vvJgbXzqv2Jbi9Vc8qE_KAg3LoTfcb-6TMuuz9NiZDMh6-Z-AXijBy_zznmoTP6p2MXFaByPlAu7wVF6vx27IVyRcRKwRdvOMD4I7TtLPsITsIyXKmY7UjkLaW07G_b0XxNEs-lkg"/>
+          <p:cNvPr id="11" name="Picture 10"/>
           <p:cNvPicPr>
-            <a:picLocks noChangeAspect="1" noChangeArrowheads="1"/>
+            <a:picLocks noChangeAspect="1"/>
           </p:cNvPicPr>
           <p:nvPr/>
         </p:nvPicPr>
@@ -17913,29 +18594,48 @@
               </a:ext>
             </a:extLst>
           </a:blip>
-          <a:srcRect/>
           <a:stretch>
             <a:fillRect/>
           </a:stretch>
         </p:blipFill>
-        <p:spPr bwMode="auto">
+        <p:spPr>
           <a:xfrm>
-            <a:off x="2662238" y="2209800"/>
-            <a:ext cx="6867525" cy="3352801"/>
+            <a:off x="7010400" y="2590800"/>
+            <a:ext cx="3962400" cy="2971800"/>
           </a:xfrm>
           <a:prstGeom prst="rect">
             <a:avLst/>
           </a:prstGeom>
-          <a:noFill/>
-          <a:extLst>
-            <a:ext uri="{909E8E84-426E-40DD-AFC4-6F175D3DCCD1}">
-              <a14:hiddenFill xmlns:a14="http://schemas.microsoft.com/office/drawing/2010/main">
-                <a:solidFill>
-                  <a:srgbClr val="FFFFFF"/>
-                </a:solidFill>
-              </a14:hiddenFill>
-            </a:ext>
-          </a:extLst>
+        </p:spPr>
+      </p:pic>
+      <p:pic>
+        <p:nvPicPr>
+          <p:cNvPr id="12" name="Picture 11"/>
+          <p:cNvPicPr>
+            <a:picLocks noChangeAspect="1"/>
+          </p:cNvPicPr>
+          <p:nvPr/>
+        </p:nvPicPr>
+        <p:blipFill>
+          <a:blip r:embed="rId3">
+            <a:extLst>
+              <a:ext uri="{28A0092B-C50C-407E-A947-70E740481C1C}">
+                <a14:useLocalDpi xmlns:a14="http://schemas.microsoft.com/office/drawing/2010/main" val="0"/>
+              </a:ext>
+            </a:extLst>
+          </a:blip>
+          <a:stretch>
+            <a:fillRect/>
+          </a:stretch>
+        </p:blipFill>
+        <p:spPr>
+          <a:xfrm>
+            <a:off x="1219200" y="2590800"/>
+            <a:ext cx="3962400" cy="2971800"/>
+          </a:xfrm>
+          <a:prstGeom prst="rect">
+            <a:avLst/>
+          </a:prstGeom>
         </p:spPr>
       </p:pic>
     </p:spTree>

</xml_diff>